<commit_message>
last minute demo god dance
</commit_message>
<xml_diff>
--- a/images/traffic control interactions.pptx
+++ b/images/traffic control interactions.pptx
@@ -277,7 +277,7 @@
           <a:p>
             <a:fld id="{96D6DA72-867A-7B43-A112-561C42E363B9}" type="datetimeFigureOut">
               <a:rPr lang="en-US" smtClean="0"/>
-              <a:t>9/20/18</a:t>
+              <a:t>9/27/18</a:t>
             </a:fld>
             <a:endParaRPr lang="en-US"/>
           </a:p>
@@ -475,7 +475,7 @@
           <a:p>
             <a:fld id="{96D6DA72-867A-7B43-A112-561C42E363B9}" type="datetimeFigureOut">
               <a:rPr lang="en-US" smtClean="0"/>
-              <a:t>9/20/18</a:t>
+              <a:t>9/27/18</a:t>
             </a:fld>
             <a:endParaRPr lang="en-US"/>
           </a:p>
@@ -683,7 +683,7 @@
           <a:p>
             <a:fld id="{96D6DA72-867A-7B43-A112-561C42E363B9}" type="datetimeFigureOut">
               <a:rPr lang="en-US" smtClean="0"/>
-              <a:t>9/20/18</a:t>
+              <a:t>9/27/18</a:t>
             </a:fld>
             <a:endParaRPr lang="en-US"/>
           </a:p>
@@ -881,7 +881,7 @@
           <a:p>
             <a:fld id="{96D6DA72-867A-7B43-A112-561C42E363B9}" type="datetimeFigureOut">
               <a:rPr lang="en-US" smtClean="0"/>
-              <a:t>9/20/18</a:t>
+              <a:t>9/27/18</a:t>
             </a:fld>
             <a:endParaRPr lang="en-US"/>
           </a:p>
@@ -1156,7 +1156,7 @@
           <a:p>
             <a:fld id="{96D6DA72-867A-7B43-A112-561C42E363B9}" type="datetimeFigureOut">
               <a:rPr lang="en-US" smtClean="0"/>
-              <a:t>9/20/18</a:t>
+              <a:t>9/27/18</a:t>
             </a:fld>
             <a:endParaRPr lang="en-US"/>
           </a:p>
@@ -1421,7 +1421,7 @@
           <a:p>
             <a:fld id="{96D6DA72-867A-7B43-A112-561C42E363B9}" type="datetimeFigureOut">
               <a:rPr lang="en-US" smtClean="0"/>
-              <a:t>9/20/18</a:t>
+              <a:t>9/27/18</a:t>
             </a:fld>
             <a:endParaRPr lang="en-US"/>
           </a:p>
@@ -1833,7 +1833,7 @@
           <a:p>
             <a:fld id="{96D6DA72-867A-7B43-A112-561C42E363B9}" type="datetimeFigureOut">
               <a:rPr lang="en-US" smtClean="0"/>
-              <a:t>9/20/18</a:t>
+              <a:t>9/27/18</a:t>
             </a:fld>
             <a:endParaRPr lang="en-US"/>
           </a:p>
@@ -1974,7 +1974,7 @@
           <a:p>
             <a:fld id="{96D6DA72-867A-7B43-A112-561C42E363B9}" type="datetimeFigureOut">
               <a:rPr lang="en-US" smtClean="0"/>
-              <a:t>9/20/18</a:t>
+              <a:t>9/27/18</a:t>
             </a:fld>
             <a:endParaRPr lang="en-US"/>
           </a:p>
@@ -2087,7 +2087,7 @@
           <a:p>
             <a:fld id="{96D6DA72-867A-7B43-A112-561C42E363B9}" type="datetimeFigureOut">
               <a:rPr lang="en-US" smtClean="0"/>
-              <a:t>9/20/18</a:t>
+              <a:t>9/27/18</a:t>
             </a:fld>
             <a:endParaRPr lang="en-US"/>
           </a:p>
@@ -2398,7 +2398,7 @@
           <a:p>
             <a:fld id="{96D6DA72-867A-7B43-A112-561C42E363B9}" type="datetimeFigureOut">
               <a:rPr lang="en-US" smtClean="0"/>
-              <a:t>9/20/18</a:t>
+              <a:t>9/27/18</a:t>
             </a:fld>
             <a:endParaRPr lang="en-US"/>
           </a:p>
@@ -2686,7 +2686,7 @@
           <a:p>
             <a:fld id="{96D6DA72-867A-7B43-A112-561C42E363B9}" type="datetimeFigureOut">
               <a:rPr lang="en-US" smtClean="0"/>
-              <a:t>9/20/18</a:t>
+              <a:t>9/27/18</a:t>
             </a:fld>
             <a:endParaRPr lang="en-US"/>
           </a:p>
@@ -2927,7 +2927,7 @@
           <a:p>
             <a:fld id="{96D6DA72-867A-7B43-A112-561C42E363B9}" type="datetimeFigureOut">
               <a:rPr lang="en-US" smtClean="0"/>
-              <a:t>9/20/18</a:t>
+              <a:t>9/27/18</a:t>
             </a:fld>
             <a:endParaRPr lang="en-US"/>
           </a:p>
@@ -3945,8 +3945,8 @@
         </p:nvSpPr>
         <p:spPr>
           <a:xfrm>
-            <a:off x="5140053" y="2364159"/>
-            <a:ext cx="3538064" cy="615553"/>
+            <a:off x="765673" y="2532738"/>
+            <a:ext cx="4093082" cy="615553"/>
           </a:xfrm>
           <a:prstGeom prst="rect">
             <a:avLst/>
@@ -3961,15 +3961,7 @@
           <a:p>
             <a:r>
               <a:rPr lang="en-US" sz="1600" dirty="0"/>
-              <a:t>https://</a:t>
-            </a:r>
-            <a:r>
-              <a:rPr lang="en-US" sz="1600" dirty="0" err="1"/>
-              <a:t>video.ciab.cdn.local</a:t>
-            </a:r>
-            <a:r>
-              <a:rPr lang="en-US" sz="1600" dirty="0"/>
-              <a:t>/</a:t>
+              <a:t>https://video.demo1.mycdn.ciab.test/</a:t>
             </a:r>
             <a:r>
               <a:rPr lang="en-US" sz="1600" dirty="0" err="1"/>
@@ -15227,8 +15219,8 @@
         </p:nvSpPr>
         <p:spPr>
           <a:xfrm>
-            <a:off x="1657923" y="1140482"/>
-            <a:ext cx="3459406" cy="587810"/>
+            <a:off x="1019331" y="1140482"/>
+            <a:ext cx="4097998" cy="615553"/>
           </a:xfrm>
           <a:prstGeom prst="rect">
             <a:avLst/>
@@ -15243,15 +15235,7 @@
           <a:p>
             <a:r>
               <a:rPr lang="en-US" sz="1600" dirty="0"/>
-              <a:t>https://</a:t>
-            </a:r>
-            <a:r>
-              <a:rPr lang="en-US" sz="1600" dirty="0" err="1"/>
-              <a:t>video.ciab.cdn.local</a:t>
-            </a:r>
-            <a:r>
-              <a:rPr lang="en-US" sz="1600" dirty="0"/>
-              <a:t>/</a:t>
+              <a:t>https://video.demo1.mycdn.ciab.test/</a:t>
             </a:r>
             <a:r>
               <a:rPr lang="en-US" sz="1600" dirty="0" err="1"/>
@@ -15326,7 +15310,7 @@
         <p:spPr>
           <a:xfrm>
             <a:off x="8494762" y="1939478"/>
-            <a:ext cx="1079007" cy="617201"/>
+            <a:ext cx="1998353" cy="646331"/>
           </a:xfrm>
           <a:prstGeom prst="rect">
             <a:avLst/>
@@ -15340,8 +15324,12 @@
           <a:lstStyle/>
           <a:p>
             <a:r>
+              <a:rPr lang="en-US" dirty="0"/>
+              <a:t>.</a:t>
+            </a:r>
+            <a:r>
               <a:rPr lang="en-US" dirty="0" err="1"/>
-              <a:t>cdn.local</a:t>
+              <a:t>ciab.test</a:t>
             </a:r>
             <a:endParaRPr lang="en-US" dirty="0"/>
           </a:p>
@@ -15723,57 +15711,6 @@
       </p:grpSp>
       <p:sp>
         <p:nvSpPr>
-          <p:cNvPr id="32" name="TextBox 31">
-            <a:extLst>
-              <a:ext uri="{FF2B5EF4-FFF2-40B4-BE49-F238E27FC236}">
-                <a16:creationId xmlns:a16="http://schemas.microsoft.com/office/drawing/2014/main" id="{7F70216D-FDA6-E14D-AEB0-78532D3C7FA3}"/>
-              </a:ext>
-            </a:extLst>
-          </p:cNvPr>
-          <p:cNvSpPr txBox="1"/>
-          <p:nvPr/>
-        </p:nvSpPr>
-        <p:spPr>
-          <a:xfrm>
-            <a:off x="1657923" y="1140482"/>
-            <a:ext cx="3459406" cy="587810"/>
-          </a:xfrm>
-          <a:prstGeom prst="rect">
-            <a:avLst/>
-          </a:prstGeom>
-          <a:noFill/>
-        </p:spPr>
-        <p:txBody>
-          <a:bodyPr wrap="square" rtlCol="0">
-            <a:spAutoFit/>
-          </a:bodyPr>
-          <a:lstStyle/>
-          <a:p>
-            <a:r>
-              <a:rPr lang="en-US" sz="1600" dirty="0"/>
-              <a:t>https://</a:t>
-            </a:r>
-            <a:r>
-              <a:rPr lang="en-US" sz="1600" dirty="0" err="1"/>
-              <a:t>video.ciab.cdn.local</a:t>
-            </a:r>
-            <a:r>
-              <a:rPr lang="en-US" sz="1600" dirty="0"/>
-              <a:t>/</a:t>
-            </a:r>
-            <a:r>
-              <a:rPr lang="en-US" sz="1600" dirty="0" err="1"/>
-              <a:t>foo.png</a:t>
-            </a:r>
-            <a:endParaRPr lang="en-US" sz="1600" dirty="0"/>
-          </a:p>
-          <a:p>
-            <a:endParaRPr lang="en-US" dirty="0"/>
-          </a:p>
-        </p:txBody>
-      </p:sp>
-      <p:sp>
-        <p:nvSpPr>
           <p:cNvPr id="105" name="TextBox 104">
             <a:extLst>
               <a:ext uri="{FF2B5EF4-FFF2-40B4-BE49-F238E27FC236}">
@@ -16114,10 +16051,10 @@
       </p:sp>
       <p:sp>
         <p:nvSpPr>
-          <p:cNvPr id="70" name="TextBox 69">
-            <a:extLst>
-              <a:ext uri="{FF2B5EF4-FFF2-40B4-BE49-F238E27FC236}">
-                <a16:creationId xmlns:a16="http://schemas.microsoft.com/office/drawing/2014/main" id="{B6117BBF-6E8E-BC42-8545-E2E8C82697F9}"/>
+          <p:cNvPr id="72" name="TextBox 71">
+            <a:extLst>
+              <a:ext uri="{FF2B5EF4-FFF2-40B4-BE49-F238E27FC236}">
+                <a16:creationId xmlns:a16="http://schemas.microsoft.com/office/drawing/2014/main" id="{C5DFE82B-303E-5546-BA50-3F98B156B480}"/>
               </a:ext>
             </a:extLst>
           </p:cNvPr>
@@ -16126,8 +16063,8 @@
         </p:nvSpPr>
         <p:spPr>
           <a:xfrm>
-            <a:off x="8494762" y="1939478"/>
-            <a:ext cx="1079007" cy="617201"/>
+            <a:off x="6475950" y="3572015"/>
+            <a:ext cx="1854794" cy="646331"/>
           </a:xfrm>
           <a:prstGeom prst="rect">
             <a:avLst/>
@@ -16141,51 +16078,12 @@
           <a:lstStyle/>
           <a:p>
             <a:r>
-              <a:rPr lang="en-US" dirty="0" err="1"/>
-              <a:t>cdn.local</a:t>
-            </a:r>
-            <a:endParaRPr lang="en-US" dirty="0"/>
-          </a:p>
-          <a:p>
-            <a:endParaRPr lang="en-US" dirty="0"/>
-          </a:p>
-        </p:txBody>
-      </p:sp>
-      <p:sp>
-        <p:nvSpPr>
-          <p:cNvPr id="72" name="TextBox 71">
-            <a:extLst>
-              <a:ext uri="{FF2B5EF4-FFF2-40B4-BE49-F238E27FC236}">
-                <a16:creationId xmlns:a16="http://schemas.microsoft.com/office/drawing/2014/main" id="{C5DFE82B-303E-5546-BA50-3F98B156B480}"/>
-              </a:ext>
-            </a:extLst>
-          </p:cNvPr>
-          <p:cNvSpPr txBox="1"/>
-          <p:nvPr/>
-        </p:nvSpPr>
-        <p:spPr>
-          <a:xfrm>
-            <a:off x="6475950" y="3572015"/>
-            <a:ext cx="1854794" cy="617201"/>
-          </a:xfrm>
-          <a:prstGeom prst="rect">
-            <a:avLst/>
-          </a:prstGeom>
-          <a:noFill/>
-        </p:spPr>
-        <p:txBody>
-          <a:bodyPr wrap="square" rtlCol="0">
-            <a:spAutoFit/>
-          </a:bodyPr>
-          <a:lstStyle/>
-          <a:p>
-            <a:r>
               <a:rPr lang="en-US" dirty="0"/>
               <a:t>*.</a:t>
             </a:r>
             <a:r>
               <a:rPr lang="en-US" dirty="0" err="1"/>
-              <a:t>ciab.cdn.local</a:t>
+              <a:t>mycdn.ciab.test</a:t>
             </a:r>
             <a:endParaRPr lang="en-US" dirty="0"/>
           </a:p>
@@ -16242,6 +16140,92 @@
           </a:fontRef>
         </p:style>
       </p:cxnSp>
+      <p:sp>
+        <p:nvSpPr>
+          <p:cNvPr id="24" name="TextBox 23">
+            <a:extLst>
+              <a:ext uri="{FF2B5EF4-FFF2-40B4-BE49-F238E27FC236}">
+                <a16:creationId xmlns:a16="http://schemas.microsoft.com/office/drawing/2014/main" id="{868A41CB-6F92-6049-A386-D1429ABB9807}"/>
+              </a:ext>
+            </a:extLst>
+          </p:cNvPr>
+          <p:cNvSpPr txBox="1"/>
+          <p:nvPr/>
+        </p:nvSpPr>
+        <p:spPr>
+          <a:xfrm>
+            <a:off x="1019331" y="1140482"/>
+            <a:ext cx="4097998" cy="615553"/>
+          </a:xfrm>
+          <a:prstGeom prst="rect">
+            <a:avLst/>
+          </a:prstGeom>
+          <a:noFill/>
+        </p:spPr>
+        <p:txBody>
+          <a:bodyPr wrap="square" rtlCol="0">
+            <a:spAutoFit/>
+          </a:bodyPr>
+          <a:lstStyle/>
+          <a:p>
+            <a:r>
+              <a:rPr lang="en-US" sz="1600" dirty="0"/>
+              <a:t>https://video.demo1.mycdn.ciab.test/</a:t>
+            </a:r>
+            <a:r>
+              <a:rPr lang="en-US" sz="1600" dirty="0" err="1"/>
+              <a:t>foo.png</a:t>
+            </a:r>
+            <a:endParaRPr lang="en-US" sz="1600" dirty="0"/>
+          </a:p>
+          <a:p>
+            <a:endParaRPr lang="en-US" dirty="0"/>
+          </a:p>
+        </p:txBody>
+      </p:sp>
+      <p:sp>
+        <p:nvSpPr>
+          <p:cNvPr id="31" name="TextBox 30">
+            <a:extLst>
+              <a:ext uri="{FF2B5EF4-FFF2-40B4-BE49-F238E27FC236}">
+                <a16:creationId xmlns:a16="http://schemas.microsoft.com/office/drawing/2014/main" id="{90B61A08-B0E6-D149-8268-F60A92A2A484}"/>
+              </a:ext>
+            </a:extLst>
+          </p:cNvPr>
+          <p:cNvSpPr txBox="1"/>
+          <p:nvPr/>
+        </p:nvSpPr>
+        <p:spPr>
+          <a:xfrm>
+            <a:off x="8494762" y="1939478"/>
+            <a:ext cx="1998353" cy="646331"/>
+          </a:xfrm>
+          <a:prstGeom prst="rect">
+            <a:avLst/>
+          </a:prstGeom>
+          <a:noFill/>
+        </p:spPr>
+        <p:txBody>
+          <a:bodyPr wrap="square" rtlCol="0">
+            <a:spAutoFit/>
+          </a:bodyPr>
+          <a:lstStyle/>
+          <a:p>
+            <a:r>
+              <a:rPr lang="en-US" dirty="0"/>
+              <a:t>.</a:t>
+            </a:r>
+            <a:r>
+              <a:rPr lang="en-US" dirty="0" err="1"/>
+              <a:t>ciab.test</a:t>
+            </a:r>
+            <a:endParaRPr lang="en-US" dirty="0"/>
+          </a:p>
+          <a:p>
+            <a:endParaRPr lang="en-US" dirty="0"/>
+          </a:p>
+        </p:txBody>
+      </p:sp>
     </p:spTree>
     <p:extLst>
       <p:ext uri="{BB962C8B-B14F-4D97-AF65-F5344CB8AC3E}">
@@ -16603,57 +16587,6 @@
           </p:txBody>
         </p:sp>
       </p:grpSp>
-      <p:sp>
-        <p:nvSpPr>
-          <p:cNvPr id="32" name="TextBox 31">
-            <a:extLst>
-              <a:ext uri="{FF2B5EF4-FFF2-40B4-BE49-F238E27FC236}">
-                <a16:creationId xmlns:a16="http://schemas.microsoft.com/office/drawing/2014/main" id="{7F70216D-FDA6-E14D-AEB0-78532D3C7FA3}"/>
-              </a:ext>
-            </a:extLst>
-          </p:cNvPr>
-          <p:cNvSpPr txBox="1"/>
-          <p:nvPr/>
-        </p:nvSpPr>
-        <p:spPr>
-          <a:xfrm>
-            <a:off x="1657923" y="1140482"/>
-            <a:ext cx="3459406" cy="587810"/>
-          </a:xfrm>
-          <a:prstGeom prst="rect">
-            <a:avLst/>
-          </a:prstGeom>
-          <a:noFill/>
-        </p:spPr>
-        <p:txBody>
-          <a:bodyPr wrap="square" rtlCol="0">
-            <a:spAutoFit/>
-          </a:bodyPr>
-          <a:lstStyle/>
-          <a:p>
-            <a:r>
-              <a:rPr lang="en-US" sz="1600" dirty="0"/>
-              <a:t>https://</a:t>
-            </a:r>
-            <a:r>
-              <a:rPr lang="en-US" sz="1600" dirty="0" err="1"/>
-              <a:t>video.ciab.cdn.local</a:t>
-            </a:r>
-            <a:r>
-              <a:rPr lang="en-US" sz="1600" dirty="0"/>
-              <a:t>/</a:t>
-            </a:r>
-            <a:r>
-              <a:rPr lang="en-US" sz="1600" dirty="0" err="1"/>
-              <a:t>foo.png</a:t>
-            </a:r>
-            <a:endParaRPr lang="en-US" sz="1600" dirty="0"/>
-          </a:p>
-          <a:p>
-            <a:endParaRPr lang="en-US" dirty="0"/>
-          </a:p>
-        </p:txBody>
-      </p:sp>
       <p:cxnSp>
         <p:nvCxnSpPr>
           <p:cNvPr id="61" name="Straight Arrow Connector 60">
@@ -17128,88 +17061,6 @@
       </p:sp>
       <p:sp>
         <p:nvSpPr>
-          <p:cNvPr id="70" name="TextBox 69">
-            <a:extLst>
-              <a:ext uri="{FF2B5EF4-FFF2-40B4-BE49-F238E27FC236}">
-                <a16:creationId xmlns:a16="http://schemas.microsoft.com/office/drawing/2014/main" id="{B6117BBF-6E8E-BC42-8545-E2E8C82697F9}"/>
-              </a:ext>
-            </a:extLst>
-          </p:cNvPr>
-          <p:cNvSpPr txBox="1"/>
-          <p:nvPr/>
-        </p:nvSpPr>
-        <p:spPr>
-          <a:xfrm>
-            <a:off x="8494762" y="1939478"/>
-            <a:ext cx="1079007" cy="617201"/>
-          </a:xfrm>
-          <a:prstGeom prst="rect">
-            <a:avLst/>
-          </a:prstGeom>
-          <a:noFill/>
-        </p:spPr>
-        <p:txBody>
-          <a:bodyPr wrap="square" rtlCol="0">
-            <a:spAutoFit/>
-          </a:bodyPr>
-          <a:lstStyle/>
-          <a:p>
-            <a:r>
-              <a:rPr lang="en-US" dirty="0" err="1"/>
-              <a:t>cdn.local</a:t>
-            </a:r>
-            <a:endParaRPr lang="en-US" dirty="0"/>
-          </a:p>
-          <a:p>
-            <a:endParaRPr lang="en-US" dirty="0"/>
-          </a:p>
-        </p:txBody>
-      </p:sp>
-      <p:sp>
-        <p:nvSpPr>
-          <p:cNvPr id="72" name="TextBox 71">
-            <a:extLst>
-              <a:ext uri="{FF2B5EF4-FFF2-40B4-BE49-F238E27FC236}">
-                <a16:creationId xmlns:a16="http://schemas.microsoft.com/office/drawing/2014/main" id="{C5DFE82B-303E-5546-BA50-3F98B156B480}"/>
-              </a:ext>
-            </a:extLst>
-          </p:cNvPr>
-          <p:cNvSpPr txBox="1"/>
-          <p:nvPr/>
-        </p:nvSpPr>
-        <p:spPr>
-          <a:xfrm>
-            <a:off x="6475950" y="3572015"/>
-            <a:ext cx="1854794" cy="617201"/>
-          </a:xfrm>
-          <a:prstGeom prst="rect">
-            <a:avLst/>
-          </a:prstGeom>
-          <a:noFill/>
-        </p:spPr>
-        <p:txBody>
-          <a:bodyPr wrap="square" rtlCol="0">
-            <a:spAutoFit/>
-          </a:bodyPr>
-          <a:lstStyle/>
-          <a:p>
-            <a:r>
-              <a:rPr lang="en-US" dirty="0"/>
-              <a:t>*.</a:t>
-            </a:r>
-            <a:r>
-              <a:rPr lang="en-US" dirty="0" err="1"/>
-              <a:t>ciab.cdn.local</a:t>
-            </a:r>
-            <a:endParaRPr lang="en-US" dirty="0"/>
-          </a:p>
-          <a:p>
-            <a:endParaRPr lang="en-US" dirty="0"/>
-          </a:p>
-        </p:txBody>
-      </p:sp>
-      <p:sp>
-        <p:nvSpPr>
           <p:cNvPr id="66" name="TextBox 65">
             <a:extLst>
               <a:ext uri="{FF2B5EF4-FFF2-40B4-BE49-F238E27FC236}">
@@ -17294,6 +17145,135 @@
           </a:fontRef>
         </p:style>
       </p:cxnSp>
+      <p:sp>
+        <p:nvSpPr>
+          <p:cNvPr id="29" name="TextBox 28">
+            <a:extLst>
+              <a:ext uri="{FF2B5EF4-FFF2-40B4-BE49-F238E27FC236}">
+                <a16:creationId xmlns:a16="http://schemas.microsoft.com/office/drawing/2014/main" id="{7D700ECB-893C-524E-A4E2-FA76BD87E143}"/>
+              </a:ext>
+            </a:extLst>
+          </p:cNvPr>
+          <p:cNvSpPr txBox="1"/>
+          <p:nvPr/>
+        </p:nvSpPr>
+        <p:spPr>
+          <a:xfrm>
+            <a:off x="1019331" y="1140482"/>
+            <a:ext cx="4097998" cy="615553"/>
+          </a:xfrm>
+          <a:prstGeom prst="rect">
+            <a:avLst/>
+          </a:prstGeom>
+          <a:noFill/>
+        </p:spPr>
+        <p:txBody>
+          <a:bodyPr wrap="square" rtlCol="0">
+            <a:spAutoFit/>
+          </a:bodyPr>
+          <a:lstStyle/>
+          <a:p>
+            <a:r>
+              <a:rPr lang="en-US" sz="1600" dirty="0"/>
+              <a:t>https://video.demo1.mycdn.ciab.test/</a:t>
+            </a:r>
+            <a:r>
+              <a:rPr lang="en-US" sz="1600" dirty="0" err="1"/>
+              <a:t>foo.png</a:t>
+            </a:r>
+            <a:endParaRPr lang="en-US" sz="1600" dirty="0"/>
+          </a:p>
+          <a:p>
+            <a:endParaRPr lang="en-US" dirty="0"/>
+          </a:p>
+        </p:txBody>
+      </p:sp>
+      <p:sp>
+        <p:nvSpPr>
+          <p:cNvPr id="35" name="TextBox 34">
+            <a:extLst>
+              <a:ext uri="{FF2B5EF4-FFF2-40B4-BE49-F238E27FC236}">
+                <a16:creationId xmlns:a16="http://schemas.microsoft.com/office/drawing/2014/main" id="{5540BA01-9959-EE42-BE33-9C820A2F07A8}"/>
+              </a:ext>
+            </a:extLst>
+          </p:cNvPr>
+          <p:cNvSpPr txBox="1"/>
+          <p:nvPr/>
+        </p:nvSpPr>
+        <p:spPr>
+          <a:xfrm>
+            <a:off x="8494762" y="1939478"/>
+            <a:ext cx="1998353" cy="646331"/>
+          </a:xfrm>
+          <a:prstGeom prst="rect">
+            <a:avLst/>
+          </a:prstGeom>
+          <a:noFill/>
+        </p:spPr>
+        <p:txBody>
+          <a:bodyPr wrap="square" rtlCol="0">
+            <a:spAutoFit/>
+          </a:bodyPr>
+          <a:lstStyle/>
+          <a:p>
+            <a:r>
+              <a:rPr lang="en-US" dirty="0"/>
+              <a:t>.</a:t>
+            </a:r>
+            <a:r>
+              <a:rPr lang="en-US" dirty="0" err="1"/>
+              <a:t>ciab.test</a:t>
+            </a:r>
+            <a:endParaRPr lang="en-US" dirty="0"/>
+          </a:p>
+          <a:p>
+            <a:endParaRPr lang="en-US" dirty="0"/>
+          </a:p>
+        </p:txBody>
+      </p:sp>
+      <p:sp>
+        <p:nvSpPr>
+          <p:cNvPr id="36" name="TextBox 35">
+            <a:extLst>
+              <a:ext uri="{FF2B5EF4-FFF2-40B4-BE49-F238E27FC236}">
+                <a16:creationId xmlns:a16="http://schemas.microsoft.com/office/drawing/2014/main" id="{CA7B58AB-7331-AD4A-BD63-6E015AE968EB}"/>
+              </a:ext>
+            </a:extLst>
+          </p:cNvPr>
+          <p:cNvSpPr txBox="1"/>
+          <p:nvPr/>
+        </p:nvSpPr>
+        <p:spPr>
+          <a:xfrm>
+            <a:off x="6475950" y="3572015"/>
+            <a:ext cx="1854794" cy="646331"/>
+          </a:xfrm>
+          <a:prstGeom prst="rect">
+            <a:avLst/>
+          </a:prstGeom>
+          <a:noFill/>
+        </p:spPr>
+        <p:txBody>
+          <a:bodyPr wrap="square" rtlCol="0">
+            <a:spAutoFit/>
+          </a:bodyPr>
+          <a:lstStyle/>
+          <a:p>
+            <a:r>
+              <a:rPr lang="en-US" dirty="0"/>
+              <a:t>*.</a:t>
+            </a:r>
+            <a:r>
+              <a:rPr lang="en-US" dirty="0" err="1"/>
+              <a:t>mycdn.ciab.test</a:t>
+            </a:r>
+            <a:endParaRPr lang="en-US" dirty="0"/>
+          </a:p>
+          <a:p>
+            <a:endParaRPr lang="en-US" dirty="0"/>
+          </a:p>
+        </p:txBody>
+      </p:sp>
     </p:spTree>
     <p:extLst>
       <p:ext uri="{BB962C8B-B14F-4D97-AF65-F5344CB8AC3E}">
@@ -17867,57 +17847,6 @@
           </p:txBody>
         </p:sp>
       </p:grpSp>
-      <p:sp>
-        <p:nvSpPr>
-          <p:cNvPr id="32" name="TextBox 31">
-            <a:extLst>
-              <a:ext uri="{FF2B5EF4-FFF2-40B4-BE49-F238E27FC236}">
-                <a16:creationId xmlns:a16="http://schemas.microsoft.com/office/drawing/2014/main" id="{7F70216D-FDA6-E14D-AEB0-78532D3C7FA3}"/>
-              </a:ext>
-            </a:extLst>
-          </p:cNvPr>
-          <p:cNvSpPr txBox="1"/>
-          <p:nvPr/>
-        </p:nvSpPr>
-        <p:spPr>
-          <a:xfrm>
-            <a:off x="1657923" y="1140482"/>
-            <a:ext cx="3459406" cy="587810"/>
-          </a:xfrm>
-          <a:prstGeom prst="rect">
-            <a:avLst/>
-          </a:prstGeom>
-          <a:noFill/>
-        </p:spPr>
-        <p:txBody>
-          <a:bodyPr wrap="square" rtlCol="0">
-            <a:spAutoFit/>
-          </a:bodyPr>
-          <a:lstStyle/>
-          <a:p>
-            <a:r>
-              <a:rPr lang="en-US" sz="1600" dirty="0"/>
-              <a:t>https://</a:t>
-            </a:r>
-            <a:r>
-              <a:rPr lang="en-US" sz="1600" dirty="0" err="1"/>
-              <a:t>video.ciab.cdn.local</a:t>
-            </a:r>
-            <a:r>
-              <a:rPr lang="en-US" sz="1600" dirty="0"/>
-              <a:t>/</a:t>
-            </a:r>
-            <a:r>
-              <a:rPr lang="en-US" sz="1600" dirty="0" err="1"/>
-              <a:t>foo.png</a:t>
-            </a:r>
-            <a:endParaRPr lang="en-US" sz="1600" dirty="0"/>
-          </a:p>
-          <a:p>
-            <a:endParaRPr lang="en-US" dirty="0"/>
-          </a:p>
-        </p:txBody>
-      </p:sp>
       <p:grpSp>
         <p:nvGrpSpPr>
           <p:cNvPr id="41" name="Group 40">
@@ -18709,88 +18638,6 @@
       </p:sp>
       <p:sp>
         <p:nvSpPr>
-          <p:cNvPr id="70" name="TextBox 69">
-            <a:extLst>
-              <a:ext uri="{FF2B5EF4-FFF2-40B4-BE49-F238E27FC236}">
-                <a16:creationId xmlns:a16="http://schemas.microsoft.com/office/drawing/2014/main" id="{B6117BBF-6E8E-BC42-8545-E2E8C82697F9}"/>
-              </a:ext>
-            </a:extLst>
-          </p:cNvPr>
-          <p:cNvSpPr txBox="1"/>
-          <p:nvPr/>
-        </p:nvSpPr>
-        <p:spPr>
-          <a:xfrm>
-            <a:off x="8494762" y="1939478"/>
-            <a:ext cx="1079007" cy="617201"/>
-          </a:xfrm>
-          <a:prstGeom prst="rect">
-            <a:avLst/>
-          </a:prstGeom>
-          <a:noFill/>
-        </p:spPr>
-        <p:txBody>
-          <a:bodyPr wrap="square" rtlCol="0">
-            <a:spAutoFit/>
-          </a:bodyPr>
-          <a:lstStyle/>
-          <a:p>
-            <a:r>
-              <a:rPr lang="en-US" dirty="0" err="1"/>
-              <a:t>cdn.local</a:t>
-            </a:r>
-            <a:endParaRPr lang="en-US" dirty="0"/>
-          </a:p>
-          <a:p>
-            <a:endParaRPr lang="en-US" dirty="0"/>
-          </a:p>
-        </p:txBody>
-      </p:sp>
-      <p:sp>
-        <p:nvSpPr>
-          <p:cNvPr id="72" name="TextBox 71">
-            <a:extLst>
-              <a:ext uri="{FF2B5EF4-FFF2-40B4-BE49-F238E27FC236}">
-                <a16:creationId xmlns:a16="http://schemas.microsoft.com/office/drawing/2014/main" id="{C5DFE82B-303E-5546-BA50-3F98B156B480}"/>
-              </a:ext>
-            </a:extLst>
-          </p:cNvPr>
-          <p:cNvSpPr txBox="1"/>
-          <p:nvPr/>
-        </p:nvSpPr>
-        <p:spPr>
-          <a:xfrm>
-            <a:off x="6475950" y="3572015"/>
-            <a:ext cx="1854794" cy="617201"/>
-          </a:xfrm>
-          <a:prstGeom prst="rect">
-            <a:avLst/>
-          </a:prstGeom>
-          <a:noFill/>
-        </p:spPr>
-        <p:txBody>
-          <a:bodyPr wrap="square" rtlCol="0">
-            <a:spAutoFit/>
-          </a:bodyPr>
-          <a:lstStyle/>
-          <a:p>
-            <a:r>
-              <a:rPr lang="en-US" dirty="0"/>
-              <a:t>*.</a:t>
-            </a:r>
-            <a:r>
-              <a:rPr lang="en-US" dirty="0" err="1"/>
-              <a:t>ciab.cdn.local</a:t>
-            </a:r>
-            <a:endParaRPr lang="en-US" dirty="0"/>
-          </a:p>
-          <a:p>
-            <a:endParaRPr lang="en-US" dirty="0"/>
-          </a:p>
-        </p:txBody>
-      </p:sp>
-      <p:sp>
-        <p:nvSpPr>
           <p:cNvPr id="66" name="TextBox 65">
             <a:extLst>
               <a:ext uri="{FF2B5EF4-FFF2-40B4-BE49-F238E27FC236}">
@@ -18972,6 +18819,135 @@
           </a:fontRef>
         </p:style>
       </p:cxnSp>
+      <p:sp>
+        <p:nvSpPr>
+          <p:cNvPr id="47" name="TextBox 46">
+            <a:extLst>
+              <a:ext uri="{FF2B5EF4-FFF2-40B4-BE49-F238E27FC236}">
+                <a16:creationId xmlns:a16="http://schemas.microsoft.com/office/drawing/2014/main" id="{F707D9B5-0780-4A48-8137-4FBEE497A925}"/>
+              </a:ext>
+            </a:extLst>
+          </p:cNvPr>
+          <p:cNvSpPr txBox="1"/>
+          <p:nvPr/>
+        </p:nvSpPr>
+        <p:spPr>
+          <a:xfrm>
+            <a:off x="1019331" y="1140482"/>
+            <a:ext cx="4097998" cy="615553"/>
+          </a:xfrm>
+          <a:prstGeom prst="rect">
+            <a:avLst/>
+          </a:prstGeom>
+          <a:noFill/>
+        </p:spPr>
+        <p:txBody>
+          <a:bodyPr wrap="square" rtlCol="0">
+            <a:spAutoFit/>
+          </a:bodyPr>
+          <a:lstStyle/>
+          <a:p>
+            <a:r>
+              <a:rPr lang="en-US" sz="1600" dirty="0"/>
+              <a:t>https://video.demo1.mycdn.ciab.test/</a:t>
+            </a:r>
+            <a:r>
+              <a:rPr lang="en-US" sz="1600" dirty="0" err="1"/>
+              <a:t>foo.png</a:t>
+            </a:r>
+            <a:endParaRPr lang="en-US" sz="1600" dirty="0"/>
+          </a:p>
+          <a:p>
+            <a:endParaRPr lang="en-US" dirty="0"/>
+          </a:p>
+        </p:txBody>
+      </p:sp>
+      <p:sp>
+        <p:nvSpPr>
+          <p:cNvPr id="48" name="TextBox 47">
+            <a:extLst>
+              <a:ext uri="{FF2B5EF4-FFF2-40B4-BE49-F238E27FC236}">
+                <a16:creationId xmlns:a16="http://schemas.microsoft.com/office/drawing/2014/main" id="{4872F177-D424-5C42-AA1D-B0CAB6C4695A}"/>
+              </a:ext>
+            </a:extLst>
+          </p:cNvPr>
+          <p:cNvSpPr txBox="1"/>
+          <p:nvPr/>
+        </p:nvSpPr>
+        <p:spPr>
+          <a:xfrm>
+            <a:off x="8494762" y="1939478"/>
+            <a:ext cx="1998353" cy="646331"/>
+          </a:xfrm>
+          <a:prstGeom prst="rect">
+            <a:avLst/>
+          </a:prstGeom>
+          <a:noFill/>
+        </p:spPr>
+        <p:txBody>
+          <a:bodyPr wrap="square" rtlCol="0">
+            <a:spAutoFit/>
+          </a:bodyPr>
+          <a:lstStyle/>
+          <a:p>
+            <a:r>
+              <a:rPr lang="en-US" dirty="0"/>
+              <a:t>.</a:t>
+            </a:r>
+            <a:r>
+              <a:rPr lang="en-US" dirty="0" err="1"/>
+              <a:t>ciab.test</a:t>
+            </a:r>
+            <a:endParaRPr lang="en-US" dirty="0"/>
+          </a:p>
+          <a:p>
+            <a:endParaRPr lang="en-US" dirty="0"/>
+          </a:p>
+        </p:txBody>
+      </p:sp>
+      <p:sp>
+        <p:nvSpPr>
+          <p:cNvPr id="52" name="TextBox 51">
+            <a:extLst>
+              <a:ext uri="{FF2B5EF4-FFF2-40B4-BE49-F238E27FC236}">
+                <a16:creationId xmlns:a16="http://schemas.microsoft.com/office/drawing/2014/main" id="{4A6FE5A1-E658-5B48-A8C3-65844A11FF4C}"/>
+              </a:ext>
+            </a:extLst>
+          </p:cNvPr>
+          <p:cNvSpPr txBox="1"/>
+          <p:nvPr/>
+        </p:nvSpPr>
+        <p:spPr>
+          <a:xfrm>
+            <a:off x="6475950" y="3572015"/>
+            <a:ext cx="1854794" cy="646331"/>
+          </a:xfrm>
+          <a:prstGeom prst="rect">
+            <a:avLst/>
+          </a:prstGeom>
+          <a:noFill/>
+        </p:spPr>
+        <p:txBody>
+          <a:bodyPr wrap="square" rtlCol="0">
+            <a:spAutoFit/>
+          </a:bodyPr>
+          <a:lstStyle/>
+          <a:p>
+            <a:r>
+              <a:rPr lang="en-US" dirty="0"/>
+              <a:t>*.</a:t>
+            </a:r>
+            <a:r>
+              <a:rPr lang="en-US" dirty="0" err="1"/>
+              <a:t>mycdn.ciab.test</a:t>
+            </a:r>
+            <a:endParaRPr lang="en-US" dirty="0"/>
+          </a:p>
+          <a:p>
+            <a:endParaRPr lang="en-US" dirty="0"/>
+          </a:p>
+        </p:txBody>
+      </p:sp>
     </p:spTree>
     <p:extLst>
       <p:ext uri="{BB962C8B-B14F-4D97-AF65-F5344CB8AC3E}">
@@ -19507,57 +19483,6 @@
           </p:txBody>
         </p:sp>
       </p:grpSp>
-      <p:sp>
-        <p:nvSpPr>
-          <p:cNvPr id="32" name="TextBox 31">
-            <a:extLst>
-              <a:ext uri="{FF2B5EF4-FFF2-40B4-BE49-F238E27FC236}">
-                <a16:creationId xmlns:a16="http://schemas.microsoft.com/office/drawing/2014/main" id="{7F70216D-FDA6-E14D-AEB0-78532D3C7FA3}"/>
-              </a:ext>
-            </a:extLst>
-          </p:cNvPr>
-          <p:cNvSpPr txBox="1"/>
-          <p:nvPr/>
-        </p:nvSpPr>
-        <p:spPr>
-          <a:xfrm>
-            <a:off x="1657923" y="1140482"/>
-            <a:ext cx="3459406" cy="587810"/>
-          </a:xfrm>
-          <a:prstGeom prst="rect">
-            <a:avLst/>
-          </a:prstGeom>
-          <a:noFill/>
-        </p:spPr>
-        <p:txBody>
-          <a:bodyPr wrap="square" rtlCol="0">
-            <a:spAutoFit/>
-          </a:bodyPr>
-          <a:lstStyle/>
-          <a:p>
-            <a:r>
-              <a:rPr lang="en-US" sz="1600" dirty="0"/>
-              <a:t>https://</a:t>
-            </a:r>
-            <a:r>
-              <a:rPr lang="en-US" sz="1600" dirty="0" err="1"/>
-              <a:t>video.ciab.cdn.local</a:t>
-            </a:r>
-            <a:r>
-              <a:rPr lang="en-US" sz="1600" dirty="0"/>
-              <a:t>/</a:t>
-            </a:r>
-            <a:r>
-              <a:rPr lang="en-US" sz="1600" dirty="0" err="1"/>
-              <a:t>foo.png</a:t>
-            </a:r>
-            <a:endParaRPr lang="en-US" sz="1600" dirty="0"/>
-          </a:p>
-          <a:p>
-            <a:endParaRPr lang="en-US" dirty="0"/>
-          </a:p>
-        </p:txBody>
-      </p:sp>
       <p:grpSp>
         <p:nvGrpSpPr>
           <p:cNvPr id="41" name="Group 40">
@@ -20179,88 +20104,6 @@
       </p:sp>
       <p:sp>
         <p:nvSpPr>
-          <p:cNvPr id="70" name="TextBox 69">
-            <a:extLst>
-              <a:ext uri="{FF2B5EF4-FFF2-40B4-BE49-F238E27FC236}">
-                <a16:creationId xmlns:a16="http://schemas.microsoft.com/office/drawing/2014/main" id="{B6117BBF-6E8E-BC42-8545-E2E8C82697F9}"/>
-              </a:ext>
-            </a:extLst>
-          </p:cNvPr>
-          <p:cNvSpPr txBox="1"/>
-          <p:nvPr/>
-        </p:nvSpPr>
-        <p:spPr>
-          <a:xfrm>
-            <a:off x="8494762" y="1939478"/>
-            <a:ext cx="1079007" cy="617201"/>
-          </a:xfrm>
-          <a:prstGeom prst="rect">
-            <a:avLst/>
-          </a:prstGeom>
-          <a:noFill/>
-        </p:spPr>
-        <p:txBody>
-          <a:bodyPr wrap="square" rtlCol="0">
-            <a:spAutoFit/>
-          </a:bodyPr>
-          <a:lstStyle/>
-          <a:p>
-            <a:r>
-              <a:rPr lang="en-US" dirty="0" err="1"/>
-              <a:t>cdn.local</a:t>
-            </a:r>
-            <a:endParaRPr lang="en-US" dirty="0"/>
-          </a:p>
-          <a:p>
-            <a:endParaRPr lang="en-US" dirty="0"/>
-          </a:p>
-        </p:txBody>
-      </p:sp>
-      <p:sp>
-        <p:nvSpPr>
-          <p:cNvPr id="72" name="TextBox 71">
-            <a:extLst>
-              <a:ext uri="{FF2B5EF4-FFF2-40B4-BE49-F238E27FC236}">
-                <a16:creationId xmlns:a16="http://schemas.microsoft.com/office/drawing/2014/main" id="{C5DFE82B-303E-5546-BA50-3F98B156B480}"/>
-              </a:ext>
-            </a:extLst>
-          </p:cNvPr>
-          <p:cNvSpPr txBox="1"/>
-          <p:nvPr/>
-        </p:nvSpPr>
-        <p:spPr>
-          <a:xfrm>
-            <a:off x="6475950" y="3572015"/>
-            <a:ext cx="1854794" cy="617201"/>
-          </a:xfrm>
-          <a:prstGeom prst="rect">
-            <a:avLst/>
-          </a:prstGeom>
-          <a:noFill/>
-        </p:spPr>
-        <p:txBody>
-          <a:bodyPr wrap="square" rtlCol="0">
-            <a:spAutoFit/>
-          </a:bodyPr>
-          <a:lstStyle/>
-          <a:p>
-            <a:r>
-              <a:rPr lang="en-US" dirty="0"/>
-              <a:t>*.</a:t>
-            </a:r>
-            <a:r>
-              <a:rPr lang="en-US" dirty="0" err="1"/>
-              <a:t>ciab.cdn.local</a:t>
-            </a:r>
-            <a:endParaRPr lang="en-US" dirty="0"/>
-          </a:p>
-          <a:p>
-            <a:endParaRPr lang="en-US" dirty="0"/>
-          </a:p>
-        </p:txBody>
-      </p:sp>
-      <p:sp>
-        <p:nvSpPr>
           <p:cNvPr id="66" name="TextBox 65">
             <a:extLst>
               <a:ext uri="{FF2B5EF4-FFF2-40B4-BE49-F238E27FC236}">
@@ -20442,6 +20285,135 @@
           </a:fontRef>
         </p:style>
       </p:cxnSp>
+      <p:sp>
+        <p:nvSpPr>
+          <p:cNvPr id="39" name="TextBox 38">
+            <a:extLst>
+              <a:ext uri="{FF2B5EF4-FFF2-40B4-BE49-F238E27FC236}">
+                <a16:creationId xmlns:a16="http://schemas.microsoft.com/office/drawing/2014/main" id="{3A2F9F70-F8DD-D642-86B6-3FBC3337B776}"/>
+              </a:ext>
+            </a:extLst>
+          </p:cNvPr>
+          <p:cNvSpPr txBox="1"/>
+          <p:nvPr/>
+        </p:nvSpPr>
+        <p:spPr>
+          <a:xfrm>
+            <a:off x="1019331" y="1140482"/>
+            <a:ext cx="4097998" cy="615553"/>
+          </a:xfrm>
+          <a:prstGeom prst="rect">
+            <a:avLst/>
+          </a:prstGeom>
+          <a:noFill/>
+        </p:spPr>
+        <p:txBody>
+          <a:bodyPr wrap="square" rtlCol="0">
+            <a:spAutoFit/>
+          </a:bodyPr>
+          <a:lstStyle/>
+          <a:p>
+            <a:r>
+              <a:rPr lang="en-US" sz="1600" dirty="0"/>
+              <a:t>https://video.demo1.mycdn.ciab.test/</a:t>
+            </a:r>
+            <a:r>
+              <a:rPr lang="en-US" sz="1600" dirty="0" err="1"/>
+              <a:t>foo.png</a:t>
+            </a:r>
+            <a:endParaRPr lang="en-US" sz="1600" dirty="0"/>
+          </a:p>
+          <a:p>
+            <a:endParaRPr lang="en-US" dirty="0"/>
+          </a:p>
+        </p:txBody>
+      </p:sp>
+      <p:sp>
+        <p:nvSpPr>
+          <p:cNvPr id="40" name="TextBox 39">
+            <a:extLst>
+              <a:ext uri="{FF2B5EF4-FFF2-40B4-BE49-F238E27FC236}">
+                <a16:creationId xmlns:a16="http://schemas.microsoft.com/office/drawing/2014/main" id="{B19107D9-3DE8-7842-86BB-1E5AF2C43150}"/>
+              </a:ext>
+            </a:extLst>
+          </p:cNvPr>
+          <p:cNvSpPr txBox="1"/>
+          <p:nvPr/>
+        </p:nvSpPr>
+        <p:spPr>
+          <a:xfrm>
+            <a:off x="8494762" y="1939478"/>
+            <a:ext cx="1998353" cy="646331"/>
+          </a:xfrm>
+          <a:prstGeom prst="rect">
+            <a:avLst/>
+          </a:prstGeom>
+          <a:noFill/>
+        </p:spPr>
+        <p:txBody>
+          <a:bodyPr wrap="square" rtlCol="0">
+            <a:spAutoFit/>
+          </a:bodyPr>
+          <a:lstStyle/>
+          <a:p>
+            <a:r>
+              <a:rPr lang="en-US" dirty="0"/>
+              <a:t>.</a:t>
+            </a:r>
+            <a:r>
+              <a:rPr lang="en-US" dirty="0" err="1"/>
+              <a:t>ciab.test</a:t>
+            </a:r>
+            <a:endParaRPr lang="en-US" dirty="0"/>
+          </a:p>
+          <a:p>
+            <a:endParaRPr lang="en-US" dirty="0"/>
+          </a:p>
+        </p:txBody>
+      </p:sp>
+      <p:sp>
+        <p:nvSpPr>
+          <p:cNvPr id="42" name="TextBox 41">
+            <a:extLst>
+              <a:ext uri="{FF2B5EF4-FFF2-40B4-BE49-F238E27FC236}">
+                <a16:creationId xmlns:a16="http://schemas.microsoft.com/office/drawing/2014/main" id="{2D3E7CAF-E854-FA44-9CC3-C934F7AB07A7}"/>
+              </a:ext>
+            </a:extLst>
+          </p:cNvPr>
+          <p:cNvSpPr txBox="1"/>
+          <p:nvPr/>
+        </p:nvSpPr>
+        <p:spPr>
+          <a:xfrm>
+            <a:off x="6475950" y="3572015"/>
+            <a:ext cx="1854794" cy="646331"/>
+          </a:xfrm>
+          <a:prstGeom prst="rect">
+            <a:avLst/>
+          </a:prstGeom>
+          <a:noFill/>
+        </p:spPr>
+        <p:txBody>
+          <a:bodyPr wrap="square" rtlCol="0">
+            <a:spAutoFit/>
+          </a:bodyPr>
+          <a:lstStyle/>
+          <a:p>
+            <a:r>
+              <a:rPr lang="en-US" dirty="0"/>
+              <a:t>*.</a:t>
+            </a:r>
+            <a:r>
+              <a:rPr lang="en-US" dirty="0" err="1"/>
+              <a:t>mycdn.ciab.test</a:t>
+            </a:r>
+            <a:endParaRPr lang="en-US" dirty="0"/>
+          </a:p>
+          <a:p>
+            <a:endParaRPr lang="en-US" dirty="0"/>
+          </a:p>
+        </p:txBody>
+      </p:sp>
     </p:spTree>
     <p:extLst>
       <p:ext uri="{BB962C8B-B14F-4D97-AF65-F5344CB8AC3E}">

</xml_diff>